<commit_message>
Small update to colours
</commit_message>
<xml_diff>
--- a/files/Introduction to Accessibility for Leadin.pptx
+++ b/files/Introduction to Accessibility for Leadin.pptx
@@ -258,7 +258,7 @@
             <a:fld id="{E36161F5-7608-4763-A3AD-1E7DC353E68A}" type="datetimeFigureOut">
               <a:rPr lang="fi-FI" smtClean="0"/>
               <a:pPr/>
-              <a:t>7.6.2016</a:t>
+              <a:t>8.6.2016</a:t>
             </a:fld>
             <a:endParaRPr lang="fi-FI"/>
           </a:p>
@@ -425,7 +425,7 @@
             <a:fld id="{2714BADE-4B45-4545-A304-D186005FAC9D}" type="datetimeFigureOut">
               <a:rPr lang="fi-FI" smtClean="0"/>
               <a:pPr/>
-              <a:t>7.6.2016</a:t>
+              <a:t>8.6.2016</a:t>
             </a:fld>
             <a:endParaRPr lang="fi-FI"/>
           </a:p>
@@ -2125,15 +2125,7 @@
             </a:pPr>
             <a:r>
               <a:rPr lang="en-GB" dirty="0" smtClean="0"/>
-              <a:t>Image </a:t>
-            </a:r>
-            <a:r>
-              <a:rPr lang="en-GB" dirty="0" smtClean="0"/>
-              <a:t>shows </a:t>
-            </a:r>
-            <a:r>
-              <a:rPr lang="en-GB" dirty="0" smtClean="0"/>
-              <a:t>a tray of blueberry muffins.</a:t>
+              <a:t>Image shows a tray of blueberry muffins.</a:t>
             </a:r>
           </a:p>
           <a:p>
@@ -3376,15 +3368,7 @@
           <a:p>
             <a:r>
               <a:rPr lang="en-GB" dirty="0" smtClean="0"/>
-              <a:t>Image shows </a:t>
-            </a:r>
-            <a:r>
-              <a:rPr lang="en-GB" dirty="0" smtClean="0"/>
-              <a:t>a </a:t>
-            </a:r>
-            <a:r>
-              <a:rPr lang="en-GB" dirty="0" smtClean="0"/>
-              <a:t>PDF download icon.</a:t>
+              <a:t>Image shows a PDF download icon.</a:t>
             </a:r>
           </a:p>
           <a:p>
@@ -4457,7 +4441,6 @@
               <a:rPr lang="en-US" b="0" dirty="0" smtClean="0"/>
               <a:t>Conclusion</a:t>
             </a:r>
-            <a:endParaRPr lang="en-US" b="0" dirty="0" smtClean="0"/>
           </a:p>
           <a:p>
             <a:endParaRPr lang="en-US" b="0" dirty="0" smtClean="0"/>
@@ -5782,7 +5765,7 @@
                 <a:tabLst/>
                 <a:defRPr/>
               </a:pPr>
-              <a:t>7.6.2016</a:t>
+              <a:t>8.6.2016</a:t>
             </a:fld>
             <a:endParaRPr lang="fi-FI" sz="1400" b="0" kern="1200" noProof="0" dirty="0">
               <a:solidFill>
@@ -11795,7 +11778,7 @@
             <a:fld id="{E8409DF2-CA33-47F5-AE5E-998725FDCDE7}" type="datetime1">
               <a:rPr lang="fi-FI" smtClean="0"/>
               <a:pPr/>
-              <a:t>7.6.2016</a:t>
+              <a:t>8.6.2016</a:t>
             </a:fld>
             <a:endParaRPr lang="fi-FI" dirty="0"/>
           </a:p>
@@ -13995,7 +13978,7 @@
             <a:fld id="{E8409DF2-CA33-47F5-AE5E-998725FDCDE7}" type="datetime1">
               <a:rPr lang="fi-FI" smtClean="0"/>
               <a:pPr/>
-              <a:t>7.6.2016</a:t>
+              <a:t>8.6.2016</a:t>
             </a:fld>
             <a:endParaRPr lang="fi-FI" dirty="0"/>
           </a:p>
@@ -14194,7 +14177,7 @@
             <a:fld id="{E8409DF2-CA33-47F5-AE5E-998725FDCDE7}" type="datetime1">
               <a:rPr lang="fi-FI" smtClean="0"/>
               <a:pPr/>
-              <a:t>7.6.2016</a:t>
+              <a:t>8.6.2016</a:t>
             </a:fld>
             <a:endParaRPr lang="fi-FI" dirty="0"/>
           </a:p>
@@ -14377,7 +14360,7 @@
             <a:fld id="{E8409DF2-CA33-47F5-AE5E-998725FDCDE7}" type="datetime1">
               <a:rPr lang="fi-FI" smtClean="0"/>
               <a:pPr/>
-              <a:t>7.6.2016</a:t>
+              <a:t>8.6.2016</a:t>
             </a:fld>
             <a:endParaRPr lang="fi-FI" dirty="0"/>
           </a:p>
@@ -14560,7 +14543,7 @@
             <a:fld id="{E8409DF2-CA33-47F5-AE5E-998725FDCDE7}" type="datetime1">
               <a:rPr lang="fi-FI" smtClean="0"/>
               <a:pPr/>
-              <a:t>7.6.2016</a:t>
+              <a:t>8.6.2016</a:t>
             </a:fld>
             <a:endParaRPr lang="fi-FI" dirty="0"/>
           </a:p>
@@ -14743,7 +14726,7 @@
             <a:fld id="{E8409DF2-CA33-47F5-AE5E-998725FDCDE7}" type="datetime1">
               <a:rPr lang="fi-FI" smtClean="0"/>
               <a:pPr/>
-              <a:t>7.6.2016</a:t>
+              <a:t>8.6.2016</a:t>
             </a:fld>
             <a:endParaRPr lang="fi-FI" dirty="0"/>
           </a:p>
@@ -16250,21 +16233,37 @@
           <a:lstStyle/>
           <a:p>
             <a:r>
-              <a:rPr lang="en-US" b="1" dirty="0"/>
+              <a:rPr lang="en-US" b="1" dirty="0">
+                <a:solidFill>
+                  <a:srgbClr val="314249"/>
+                </a:solidFill>
+              </a:rPr>
               <a:t>Hearing</a:t>
             </a:r>
           </a:p>
           <a:p>
             <a:r>
-              <a:rPr lang="en-US" dirty="0"/>
+              <a:rPr lang="en-US" dirty="0">
+                <a:solidFill>
+                  <a:srgbClr val="314249"/>
+                </a:solidFill>
+              </a:rPr>
               <a:t>Deaf, </a:t>
             </a:r>
             <a:r>
-              <a:rPr lang="en-US" dirty="0" smtClean="0"/>
+              <a:rPr lang="en-US" dirty="0" smtClean="0">
+                <a:solidFill>
+                  <a:srgbClr val="314249"/>
+                </a:solidFill>
+              </a:rPr>
               <a:t>hearing </a:t>
             </a:r>
             <a:r>
-              <a:rPr lang="en-US" dirty="0"/>
+              <a:rPr lang="en-US" dirty="0">
+                <a:solidFill>
+                  <a:srgbClr val="314249"/>
+                </a:solidFill>
+              </a:rPr>
               <a:t>impairment</a:t>
             </a:r>
           </a:p>
@@ -19426,11 +19425,7 @@
           <a:p>
             <a:r>
               <a:rPr lang="en-US" dirty="0" smtClean="0"/>
-              <a:t>Accessibility leads to a </a:t>
-            </a:r>
-            <a:r>
-              <a:rPr lang="en-US" dirty="0" smtClean="0"/>
-              <a:t>better </a:t>
+              <a:t>Accessibility leads to a better </a:t>
             </a:r>
             <a:r>
               <a:rPr lang="en-US" dirty="0"/>
@@ -19444,13 +19439,8 @@
           <a:p>
             <a:r>
               <a:rPr lang="en-US" dirty="0" smtClean="0"/>
-              <a:t>Better accessibility </a:t>
-            </a:r>
-            <a:r>
-              <a:rPr lang="en-US" dirty="0" smtClean="0"/>
-              <a:t>means better usability too</a:t>
-            </a:r>
-            <a:endParaRPr lang="en-US" dirty="0" smtClean="0"/>
+              <a:t>Better accessibility means better usability too</a:t>
+            </a:r>
           </a:p>
           <a:p>
             <a:r>

</xml_diff>